<commit_message>
updated pptx & skeleton svg
I have included RSC-ontologies' answers to the outstanding questions in the notes at Skeleton Flowchart and updated the pptx file and Skeleton svg file accordingly.
</commit_message>
<xml_diff>
--- a/docs/Flowcharts_RXNO.pptx
+++ b/docs/Flowcharts_RXNO.pptx
@@ -194,7 +194,7 @@
           <a:p>
             <a:fld id="{25BDB1D5-8591-4FE7-8C6F-8BFF281871C5}" type="datetimeFigureOut">
               <a:rPr lang="de-DE" smtClean="0"/>
-              <a:t>09.06.2021</a:t>
+              <a:t>11.06.2021</a:t>
             </a:fld>
             <a:endParaRPr lang="de-DE"/>
           </a:p>
@@ -895,7 +895,7 @@
           <a:p>
             <a:fld id="{10797E9C-0423-41BC-8D78-D8E2BA7C1C1C}" type="datetimeFigureOut">
               <a:rPr lang="de-DE" smtClean="0"/>
-              <a:t>09.06.2021</a:t>
+              <a:t>11.06.2021</a:t>
             </a:fld>
             <a:endParaRPr lang="de-DE"/>
           </a:p>
@@ -1065,7 +1065,7 @@
           <a:p>
             <a:fld id="{10797E9C-0423-41BC-8D78-D8E2BA7C1C1C}" type="datetimeFigureOut">
               <a:rPr lang="de-DE" smtClean="0"/>
-              <a:t>09.06.2021</a:t>
+              <a:t>11.06.2021</a:t>
             </a:fld>
             <a:endParaRPr lang="de-DE"/>
           </a:p>
@@ -1245,7 +1245,7 @@
           <a:p>
             <a:fld id="{10797E9C-0423-41BC-8D78-D8E2BA7C1C1C}" type="datetimeFigureOut">
               <a:rPr lang="de-DE" smtClean="0"/>
-              <a:t>09.06.2021</a:t>
+              <a:t>11.06.2021</a:t>
             </a:fld>
             <a:endParaRPr lang="de-DE"/>
           </a:p>
@@ -1415,7 +1415,7 @@
           <a:p>
             <a:fld id="{10797E9C-0423-41BC-8D78-D8E2BA7C1C1C}" type="datetimeFigureOut">
               <a:rPr lang="de-DE" smtClean="0"/>
-              <a:t>09.06.2021</a:t>
+              <a:t>11.06.2021</a:t>
             </a:fld>
             <a:endParaRPr lang="de-DE"/>
           </a:p>
@@ -1661,7 +1661,7 @@
           <a:p>
             <a:fld id="{10797E9C-0423-41BC-8D78-D8E2BA7C1C1C}" type="datetimeFigureOut">
               <a:rPr lang="de-DE" smtClean="0"/>
-              <a:t>09.06.2021</a:t>
+              <a:t>11.06.2021</a:t>
             </a:fld>
             <a:endParaRPr lang="de-DE"/>
           </a:p>
@@ -1949,7 +1949,7 @@
           <a:p>
             <a:fld id="{10797E9C-0423-41BC-8D78-D8E2BA7C1C1C}" type="datetimeFigureOut">
               <a:rPr lang="de-DE" smtClean="0"/>
-              <a:t>09.06.2021</a:t>
+              <a:t>11.06.2021</a:t>
             </a:fld>
             <a:endParaRPr lang="de-DE"/>
           </a:p>
@@ -2371,7 +2371,7 @@
           <a:p>
             <a:fld id="{10797E9C-0423-41BC-8D78-D8E2BA7C1C1C}" type="datetimeFigureOut">
               <a:rPr lang="de-DE" smtClean="0"/>
-              <a:t>09.06.2021</a:t>
+              <a:t>11.06.2021</a:t>
             </a:fld>
             <a:endParaRPr lang="de-DE"/>
           </a:p>
@@ -2489,7 +2489,7 @@
           <a:p>
             <a:fld id="{10797E9C-0423-41BC-8D78-D8E2BA7C1C1C}" type="datetimeFigureOut">
               <a:rPr lang="de-DE" smtClean="0"/>
-              <a:t>09.06.2021</a:t>
+              <a:t>11.06.2021</a:t>
             </a:fld>
             <a:endParaRPr lang="de-DE"/>
           </a:p>
@@ -2584,7 +2584,7 @@
           <a:p>
             <a:fld id="{10797E9C-0423-41BC-8D78-D8E2BA7C1C1C}" type="datetimeFigureOut">
               <a:rPr lang="de-DE" smtClean="0"/>
-              <a:t>09.06.2021</a:t>
+              <a:t>11.06.2021</a:t>
             </a:fld>
             <a:endParaRPr lang="de-DE"/>
           </a:p>
@@ -2861,7 +2861,7 @@
           <a:p>
             <a:fld id="{10797E9C-0423-41BC-8D78-D8E2BA7C1C1C}" type="datetimeFigureOut">
               <a:rPr lang="de-DE" smtClean="0"/>
-              <a:t>09.06.2021</a:t>
+              <a:t>11.06.2021</a:t>
             </a:fld>
             <a:endParaRPr lang="de-DE"/>
           </a:p>
@@ -3114,7 +3114,7 @@
           <a:p>
             <a:fld id="{10797E9C-0423-41BC-8D78-D8E2BA7C1C1C}" type="datetimeFigureOut">
               <a:rPr lang="de-DE" smtClean="0"/>
-              <a:t>09.06.2021</a:t>
+              <a:t>11.06.2021</a:t>
             </a:fld>
             <a:endParaRPr lang="de-DE"/>
           </a:p>
@@ -3330,7 +3330,7 @@
           <a:p>
             <a:fld id="{10797E9C-0423-41BC-8D78-D8E2BA7C1C1C}" type="datetimeFigureOut">
               <a:rPr lang="de-DE" smtClean="0"/>
-              <a:t>09.06.2021</a:t>
+              <a:t>11.06.2021</a:t>
             </a:fld>
             <a:endParaRPr lang="de-DE"/>
           </a:p>
@@ -15713,7 +15713,7 @@
         </p:nvGrpSpPr>
         <p:grpSpPr>
           <a:xfrm>
-            <a:off x="183584" y="1556792"/>
+            <a:off x="183584" y="1772816"/>
             <a:ext cx="4532432" cy="5040560"/>
             <a:chOff x="183584" y="1556792"/>
             <a:chExt cx="4532432" cy="5040560"/>
@@ -17357,8 +17357,8 @@
         </p:nvSpPr>
         <p:spPr>
           <a:xfrm>
-            <a:off x="153911" y="116632"/>
-            <a:ext cx="4743725" cy="1296144"/>
+            <a:off x="153911" y="44624"/>
+            <a:ext cx="4743725" cy="1620000"/>
           </a:xfrm>
           <a:prstGeom prst="roundRect">
             <a:avLst/>
@@ -17439,15 +17439,22 @@
               <a:t>single starting material must always be defined in order for these rules to work</a:t>
             </a:r>
             <a:r>
-              <a:rPr lang="en-US" sz="1000" dirty="0" smtClean="0">
+              <a:rPr lang="en-US" sz="1000" dirty="0">
                 <a:solidFill>
                   <a:schemeClr val="tx1"/>
                 </a:solidFill>
                 <a:latin typeface="Bree Serif"/>
                 <a:cs typeface="Arial" panose="020B0604020202020204" pitchFamily="34" charset="0"/>
               </a:rPr>
-              <a:t>.</a:t>
+              <a:t>. In the case of several "equal" reaction partners, take the one that contributes the larger number of atoms to the part of the product of interest.</a:t>
             </a:r>
+            <a:endParaRPr lang="en-US" sz="1000" dirty="0" smtClean="0">
+              <a:solidFill>
+                <a:schemeClr val="tx1"/>
+              </a:solidFill>
+              <a:latin typeface="Bree Serif"/>
+              <a:cs typeface="Arial" panose="020B0604020202020204" pitchFamily="34" charset="0"/>
+            </a:endParaRPr>
           </a:p>
           <a:p>
             <a:pPr marL="171450" indent="-171450">
@@ -17484,6 +17491,29 @@
               </a:rPr>
               <a:t>.</a:t>
             </a:r>
+          </a:p>
+          <a:p>
+            <a:pPr marL="171450" indent="-171450">
+              <a:buFont typeface="Arial" panose="020B0604020202020204" pitchFamily="34" charset="0"/>
+              <a:buChar char="•"/>
+            </a:pPr>
+            <a:r>
+              <a:rPr lang="en-US" sz="1000" dirty="0">
+                <a:solidFill>
+                  <a:schemeClr val="tx1"/>
+                </a:solidFill>
+                <a:latin typeface="Bree Serif"/>
+                <a:cs typeface="Arial" panose="020B0604020202020204" pitchFamily="34" charset="0"/>
+              </a:rPr>
+              <a:t>Only apply the rules of the scheme to the product if it is difficult to determine the skeleton from the starting material.</a:t>
+            </a:r>
+            <a:endParaRPr lang="en-US" sz="1000" dirty="0" smtClean="0">
+              <a:solidFill>
+                <a:schemeClr val="tx1"/>
+              </a:solidFill>
+              <a:latin typeface="Bree Serif"/>
+              <a:cs typeface="Arial" panose="020B0604020202020204" pitchFamily="34" charset="0"/>
+            </a:endParaRPr>
           </a:p>
           <a:p>
             <a:pPr marL="171450" indent="-171450">

</xml_diff>